<commit_message>
Almost done adding content for the launch.
</commit_message>
<xml_diff>
--- a/_resources_raw/WP_Box_DZC.pptx
+++ b/_resources_raw/WP_Box_DZC.pptx
@@ -5,8 +5,10 @@
     <p:sldMasterId id="2147483648" r:id="rId1"/>
   </p:sldMasterIdLst>
   <p:sldIdLst>
-    <p:sldId id="256" r:id="rId2"/>
-    <p:sldId id="257" r:id="rId3"/>
+    <p:sldId id="259" r:id="rId2"/>
+    <p:sldId id="256" r:id="rId3"/>
+    <p:sldId id="257" r:id="rId4"/>
+    <p:sldId id="258" r:id="rId5"/>
   </p:sldIdLst>
   <p:sldSz cx="5943600" cy="2971800"/>
   <p:notesSz cx="6858000" cy="9144000"/>
@@ -3082,6 +3084,109 @@
 <file path=ppt/slides/slide1.xml><?xml version="1.0" encoding="utf-8"?>
 <p:sld xmlns:a="http://schemas.openxmlformats.org/drawingml/2006/main" xmlns:r="http://schemas.openxmlformats.org/officeDocument/2006/relationships" xmlns:p="http://schemas.openxmlformats.org/presentationml/2006/main">
   <p:cSld>
+    <p:spTree>
+      <p:nvGrpSpPr>
+        <p:cNvPr id="1" name=""/>
+        <p:cNvGrpSpPr/>
+        <p:nvPr/>
+      </p:nvGrpSpPr>
+      <p:grpSpPr>
+        <a:xfrm>
+          <a:off x="0" y="0"/>
+          <a:ext cx="0" cy="0"/>
+          <a:chOff x="0" y="0"/>
+          <a:chExt cx="0" cy="0"/>
+        </a:xfrm>
+      </p:grpSpPr>
+      <p:pic>
+        <p:nvPicPr>
+          <p:cNvPr id="2" name="Picture 1" descr="Overview.png"/>
+          <p:cNvPicPr>
+            <a:picLocks noChangeAspect="1"/>
+          </p:cNvPicPr>
+          <p:nvPr/>
+        </p:nvPicPr>
+        <p:blipFill>
+          <a:blip r:embed="rId2">
+            <a:extLst>
+              <a:ext uri="{28A0092B-C50C-407E-A947-70E740481C1C}">
+                <a14:useLocalDpi xmlns:a14="http://schemas.microsoft.com/office/drawing/2010/main" val="0"/>
+              </a:ext>
+            </a:extLst>
+          </a:blip>
+          <a:stretch>
+            <a:fillRect/>
+          </a:stretch>
+        </p:blipFill>
+        <p:spPr>
+          <a:xfrm>
+            <a:off x="1241815" y="0"/>
+            <a:ext cx="3457324" cy="2913888"/>
+          </a:xfrm>
+          <a:prstGeom prst="rect">
+            <a:avLst/>
+          </a:prstGeom>
+        </p:spPr>
+      </p:pic>
+      <p:sp>
+        <p:nvSpPr>
+          <p:cNvPr id="3" name="Rectangle 2"/>
+          <p:cNvSpPr/>
+          <p:nvPr/>
+        </p:nvSpPr>
+        <p:spPr>
+          <a:xfrm>
+            <a:off x="0" y="0"/>
+            <a:ext cx="5943600" cy="2971800"/>
+          </a:xfrm>
+          <a:prstGeom prst="rect">
+            <a:avLst/>
+          </a:prstGeom>
+          <a:solidFill>
+            <a:schemeClr val="tx1">
+              <a:alpha val="30000"/>
+            </a:schemeClr>
+          </a:solidFill>
+        </p:spPr>
+        <p:style>
+          <a:lnRef idx="1">
+            <a:schemeClr val="accent1"/>
+          </a:lnRef>
+          <a:fillRef idx="3">
+            <a:schemeClr val="accent1"/>
+          </a:fillRef>
+          <a:effectRef idx="2">
+            <a:schemeClr val="accent1"/>
+          </a:effectRef>
+          <a:fontRef idx="minor">
+            <a:schemeClr val="lt1"/>
+          </a:fontRef>
+        </p:style>
+        <p:txBody>
+          <a:bodyPr rtlCol="0" anchor="ctr"/>
+          <a:lstStyle/>
+          <a:p>
+            <a:pPr algn="ctr"/>
+            <a:endParaRPr lang="en-US"/>
+          </a:p>
+        </p:txBody>
+      </p:sp>
+    </p:spTree>
+    <p:extLst>
+      <p:ext uri="{BB962C8B-B14F-4D97-AF65-F5344CB8AC3E}">
+        <p14:creationId xmlns:p14="http://schemas.microsoft.com/office/powerpoint/2010/main" val="762400366"/>
+      </p:ext>
+    </p:extLst>
+  </p:cSld>
+  <p:clrMapOvr>
+    <a:masterClrMapping/>
+  </p:clrMapOvr>
+</p:sld>
+</file>
+
+<file path=ppt/slides/slide2.xml><?xml version="1.0" encoding="utf-8"?>
+<p:sld xmlns:a="http://schemas.openxmlformats.org/drawingml/2006/main" xmlns:r="http://schemas.openxmlformats.org/officeDocument/2006/relationships" xmlns:p="http://schemas.openxmlformats.org/presentationml/2006/main">
+  <p:cSld>
     <p:bg>
       <p:bgPr>
         <a:solidFill>
@@ -3129,7 +3234,7 @@
           <a:graphicData uri="http://schemas.openxmlformats.org/presentationml/2006/ole">
             <mc:AlternateContent xmlns:mc="http://schemas.openxmlformats.org/markup-compatibility/2006">
               <mc:Choice xmlns:v="urn:schemas-microsoft-com:vml" Requires="v">
-                <p:oleObj spid="_x0000_s1111" name="Equation" r:id="rId3" imgW="1790700" imgH="469900" progId="Equation.3">
+                <p:oleObj spid="_x0000_s1160" name="Equation" r:id="rId3" imgW="1790700" imgH="469900" progId="Equation.3">
                   <p:embed/>
                 </p:oleObj>
               </mc:Choice>
@@ -3186,7 +3291,7 @@
           <a:graphicData uri="http://schemas.openxmlformats.org/presentationml/2006/ole">
             <mc:AlternateContent xmlns:mc="http://schemas.openxmlformats.org/markup-compatibility/2006">
               <mc:Choice xmlns:v="urn:schemas-microsoft-com:vml" Requires="v">
-                <p:oleObj spid="_x0000_s1112" name="Equation" r:id="rId5" imgW="787400" imgH="228600" progId="Equation.DSMT4">
+                <p:oleObj spid="_x0000_s1161" name="Equation" r:id="rId5" imgW="787400" imgH="228600" progId="Equation.DSMT4">
                   <p:embed/>
                 </p:oleObj>
               </mc:Choice>
@@ -3413,7 +3518,7 @@
           <a:graphicData uri="http://schemas.openxmlformats.org/presentationml/2006/ole">
             <mc:AlternateContent xmlns:mc="http://schemas.openxmlformats.org/markup-compatibility/2006">
               <mc:Choice xmlns:v="urn:schemas-microsoft-com:vml" Requires="v">
-                <p:oleObj spid="_x0000_s1113" name="Equation" r:id="rId7" imgW="1333500" imgH="228600" progId="Equation.DSMT4">
+                <p:oleObj spid="_x0000_s1162" name="Equation" r:id="rId7" imgW="1333500" imgH="228600" progId="Equation.DSMT4">
                   <p:embed/>
                 </p:oleObj>
               </mc:Choice>
@@ -3554,7 +3659,7 @@
           <a:graphicData uri="http://schemas.openxmlformats.org/presentationml/2006/ole">
             <mc:AlternateContent xmlns:mc="http://schemas.openxmlformats.org/markup-compatibility/2006">
               <mc:Choice xmlns:v="urn:schemas-microsoft-com:vml" Requires="v">
-                <p:oleObj spid="_x0000_s1114" name="Equation" r:id="rId9" imgW="1371600" imgH="469900" progId="Equation.DSMT4">
+                <p:oleObj spid="_x0000_s1163" name="Equation" r:id="rId9" imgW="1371600" imgH="469900" progId="Equation.DSMT4">
                   <p:embed/>
                 </p:oleObj>
               </mc:Choice>
@@ -3611,7 +3716,7 @@
           <a:graphicData uri="http://schemas.openxmlformats.org/presentationml/2006/ole">
             <mc:AlternateContent xmlns:mc="http://schemas.openxmlformats.org/markup-compatibility/2006">
               <mc:Choice xmlns:v="urn:schemas-microsoft-com:vml" Requires="v">
-                <p:oleObj spid="_x0000_s1115" name="Equation" r:id="rId11" imgW="584200" imgH="241300" progId="Equation.DSMT4">
+                <p:oleObj spid="_x0000_s1164" name="Equation" r:id="rId11" imgW="584200" imgH="241300" progId="Equation.DSMT4">
                   <p:embed/>
                 </p:oleObj>
               </mc:Choice>
@@ -3668,7 +3773,7 @@
           <a:graphicData uri="http://schemas.openxmlformats.org/presentationml/2006/ole">
             <mc:AlternateContent xmlns:mc="http://schemas.openxmlformats.org/markup-compatibility/2006">
               <mc:Choice xmlns:v="urn:schemas-microsoft-com:vml" Requires="v">
-                <p:oleObj spid="_x0000_s1116" name="Equation" r:id="rId13" imgW="381000" imgH="241300" progId="Equation.DSMT4">
+                <p:oleObj spid="_x0000_s1165" name="Equation" r:id="rId13" imgW="381000" imgH="241300" progId="Equation.DSMT4">
                   <p:embed/>
                 </p:oleObj>
               </mc:Choice>
@@ -3809,7 +3914,7 @@
           <a:graphicData uri="http://schemas.openxmlformats.org/presentationml/2006/ole">
             <mc:AlternateContent xmlns:mc="http://schemas.openxmlformats.org/markup-compatibility/2006">
               <mc:Choice xmlns:v="urn:schemas-microsoft-com:vml" Requires="v">
-                <p:oleObj spid="_x0000_s1117" name="Equation" r:id="rId15" imgW="825500" imgH="254000" progId="Equation.DSMT4">
+                <p:oleObj spid="_x0000_s1166" name="Equation" r:id="rId15" imgW="825500" imgH="254000" progId="Equation.DSMT4">
                   <p:embed/>
                 </p:oleObj>
               </mc:Choice>
@@ -3900,7 +4005,7 @@
           <a:graphicData uri="http://schemas.openxmlformats.org/presentationml/2006/ole">
             <mc:AlternateContent xmlns:mc="http://schemas.openxmlformats.org/markup-compatibility/2006">
               <mc:Choice xmlns:v="urn:schemas-microsoft-com:vml" Requires="v">
-                <p:oleObj spid="_x0000_s1118" name="Equation" r:id="rId17" imgW="393700" imgH="241300" progId="Equation.DSMT4">
+                <p:oleObj spid="_x0000_s1167" name="Equation" r:id="rId17" imgW="393700" imgH="241300" progId="Equation.DSMT4">
                   <p:embed/>
                 </p:oleObj>
               </mc:Choice>
@@ -3993,7 +4098,7 @@
           <a:graphicData uri="http://schemas.openxmlformats.org/presentationml/2006/ole">
             <mc:AlternateContent xmlns:mc="http://schemas.openxmlformats.org/markup-compatibility/2006">
               <mc:Choice xmlns:v="urn:schemas-microsoft-com:vml" Requires="v">
-                <p:oleObj spid="_x0000_s1119" name="Equation" r:id="rId19" imgW="1231900" imgH="254000" progId="Equation.DSMT4">
+                <p:oleObj spid="_x0000_s1168" name="Equation" r:id="rId19" imgW="1231900" imgH="254000" progId="Equation.DSMT4">
                   <p:embed/>
                 </p:oleObj>
               </mc:Choice>
@@ -4050,7 +4155,7 @@
           <a:graphicData uri="http://schemas.openxmlformats.org/presentationml/2006/ole">
             <mc:AlternateContent xmlns:mc="http://schemas.openxmlformats.org/markup-compatibility/2006">
               <mc:Choice xmlns:v="urn:schemas-microsoft-com:vml" Requires="v">
-                <p:oleObj spid="_x0000_s1120" name="Equation" r:id="rId21" imgW="1320800" imgH="254000" progId="Equation.DSMT4">
+                <p:oleObj spid="_x0000_s1169" name="Equation" r:id="rId21" imgW="1320800" imgH="254000" progId="Equation.DSMT4">
                   <p:embed/>
                 </p:oleObj>
               </mc:Choice>
@@ -4312,7 +4417,7 @@
           <a:graphicData uri="http://schemas.openxmlformats.org/presentationml/2006/ole">
             <mc:AlternateContent xmlns:mc="http://schemas.openxmlformats.org/markup-compatibility/2006">
               <mc:Choice xmlns:v="urn:schemas-microsoft-com:vml" Requires="v">
-                <p:oleObj spid="_x0000_s1121" name="Equation" r:id="rId23" imgW="381000" imgH="241300" progId="Equation.DSMT4">
+                <p:oleObj spid="_x0000_s1170" name="Equation" r:id="rId23" imgW="381000" imgH="241300" progId="Equation.DSMT4">
                   <p:embed/>
                 </p:oleObj>
               </mc:Choice>
@@ -4369,7 +4474,7 @@
           <a:graphicData uri="http://schemas.openxmlformats.org/presentationml/2006/ole">
             <mc:AlternateContent xmlns:mc="http://schemas.openxmlformats.org/markup-compatibility/2006">
               <mc:Choice xmlns:v="urn:schemas-microsoft-com:vml" Requires="v">
-                <p:oleObj spid="_x0000_s1122" name="Equation" r:id="rId25" imgW="609600" imgH="228600" progId="Equation.DSMT4">
+                <p:oleObj spid="_x0000_s1171" name="Equation" r:id="rId25" imgW="609600" imgH="228600" progId="Equation.DSMT4">
                   <p:embed/>
                 </p:oleObj>
               </mc:Choice>
@@ -5639,7 +5744,7 @@
 </p:sld>
 </file>
 
-<file path=ppt/slides/slide2.xml><?xml version="1.0" encoding="utf-8"?>
+<file path=ppt/slides/slide3.xml><?xml version="1.0" encoding="utf-8"?>
 <p:sld xmlns:a="http://schemas.openxmlformats.org/drawingml/2006/main" xmlns:r="http://schemas.openxmlformats.org/officeDocument/2006/relationships" xmlns:p="http://schemas.openxmlformats.org/presentationml/2006/main">
   <p:cSld>
     <p:spTree>
@@ -5736,6 +5841,562 @@
     <p:extLst>
       <p:ext uri="{BB962C8B-B14F-4D97-AF65-F5344CB8AC3E}">
         <p14:creationId xmlns:p14="http://schemas.microsoft.com/office/powerpoint/2010/main" val="770253127"/>
+      </p:ext>
+    </p:extLst>
+  </p:cSld>
+  <p:clrMapOvr>
+    <a:masterClrMapping/>
+  </p:clrMapOvr>
+</p:sld>
+</file>
+
+<file path=ppt/slides/slide4.xml><?xml version="1.0" encoding="utf-8"?>
+<p:sld xmlns:a="http://schemas.openxmlformats.org/drawingml/2006/main" xmlns:r="http://schemas.openxmlformats.org/officeDocument/2006/relationships" xmlns:p="http://schemas.openxmlformats.org/presentationml/2006/main">
+  <p:cSld>
+    <p:spTree>
+      <p:nvGrpSpPr>
+        <p:cNvPr id="1" name=""/>
+        <p:cNvGrpSpPr/>
+        <p:nvPr/>
+      </p:nvGrpSpPr>
+      <p:grpSpPr>
+        <a:xfrm>
+          <a:off x="0" y="0"/>
+          <a:ext cx="0" cy="0"/>
+          <a:chOff x="0" y="0"/>
+          <a:chExt cx="0" cy="0"/>
+        </a:xfrm>
+      </p:grpSpPr>
+      <p:sp>
+        <p:nvSpPr>
+          <p:cNvPr id="39" name="TextBox 38"/>
+          <p:cNvSpPr txBox="1"/>
+          <p:nvPr/>
+        </p:nvSpPr>
+        <p:spPr>
+          <a:xfrm>
+            <a:off x="1848475" y="315770"/>
+            <a:ext cx="1638182" cy="457424"/>
+          </a:xfrm>
+          <a:prstGeom prst="rect">
+            <a:avLst/>
+          </a:prstGeom>
+          <a:noFill/>
+          <a:ln w="25400">
+            <a:solidFill>
+              <a:schemeClr val="tx1"/>
+            </a:solidFill>
+          </a:ln>
+        </p:spPr>
+        <p:txBody>
+          <a:bodyPr wrap="square" bIns="72000" rtlCol="0">
+            <a:spAutoFit/>
+          </a:bodyPr>
+          <a:lstStyle/>
+          <a:p>
+            <a:pPr algn="ctr"/>
+            <a:r>
+              <a:rPr lang="en-GB" b="1" dirty="0" smtClean="0"/>
+              <a:t>Land-use/management changes on study farms</a:t>
+            </a:r>
+            <a:endParaRPr lang="en-GB" dirty="0"/>
+          </a:p>
+        </p:txBody>
+      </p:sp>
+      <p:sp>
+        <p:nvSpPr>
+          <p:cNvPr id="40" name="TextBox 39"/>
+          <p:cNvSpPr txBox="1"/>
+          <p:nvPr/>
+        </p:nvSpPr>
+        <p:spPr>
+          <a:xfrm>
+            <a:off x="3907904" y="409380"/>
+            <a:ext cx="1638182" cy="288147"/>
+          </a:xfrm>
+          <a:prstGeom prst="rect">
+            <a:avLst/>
+          </a:prstGeom>
+          <a:noFill/>
+          <a:ln w="25400">
+            <a:solidFill>
+              <a:schemeClr val="tx1"/>
+            </a:solidFill>
+          </a:ln>
+        </p:spPr>
+        <p:txBody>
+          <a:bodyPr wrap="square" bIns="72000" rtlCol="0">
+            <a:spAutoFit/>
+          </a:bodyPr>
+          <a:lstStyle/>
+          <a:p>
+            <a:pPr algn="ctr"/>
+            <a:r>
+              <a:rPr lang="en-GB" b="1" dirty="0" smtClean="0"/>
+              <a:t>Scenarios</a:t>
+            </a:r>
+            <a:endParaRPr lang="en-GB" b="1" dirty="0"/>
+          </a:p>
+        </p:txBody>
+      </p:sp>
+      <p:cxnSp>
+        <p:nvCxnSpPr>
+          <p:cNvPr id="41" name="Straight Arrow Connector 40"/>
+          <p:cNvCxnSpPr>
+            <a:stCxn id="40" idx="1"/>
+            <a:endCxn id="39" idx="3"/>
+          </p:cNvCxnSpPr>
+          <p:nvPr/>
+        </p:nvCxnSpPr>
+        <p:spPr>
+          <a:xfrm flipH="1" flipV="1">
+            <a:off x="3486657" y="544482"/>
+            <a:ext cx="421247" cy="8972"/>
+          </a:xfrm>
+          <a:prstGeom prst="straightConnector1">
+            <a:avLst/>
+          </a:prstGeom>
+          <a:ln w="25400">
+            <a:solidFill>
+              <a:schemeClr val="tx1"/>
+            </a:solidFill>
+            <a:tailEnd type="arrow"/>
+          </a:ln>
+        </p:spPr>
+        <p:style>
+          <a:lnRef idx="1">
+            <a:schemeClr val="accent1"/>
+          </a:lnRef>
+          <a:fillRef idx="0">
+            <a:schemeClr val="accent1"/>
+          </a:fillRef>
+          <a:effectRef idx="0">
+            <a:schemeClr val="accent1"/>
+          </a:effectRef>
+          <a:fontRef idx="minor">
+            <a:schemeClr val="tx1"/>
+          </a:fontRef>
+        </p:style>
+      </p:cxnSp>
+      <p:sp>
+        <p:nvSpPr>
+          <p:cNvPr id="42" name="TextBox 41"/>
+          <p:cNvSpPr txBox="1"/>
+          <p:nvPr/>
+        </p:nvSpPr>
+        <p:spPr>
+          <a:xfrm>
+            <a:off x="912371" y="1392290"/>
+            <a:ext cx="1076520" cy="457424"/>
+          </a:xfrm>
+          <a:prstGeom prst="rect">
+            <a:avLst/>
+          </a:prstGeom>
+          <a:noFill/>
+          <a:ln w="25400">
+            <a:solidFill>
+              <a:schemeClr val="tx1"/>
+            </a:solidFill>
+          </a:ln>
+        </p:spPr>
+        <p:txBody>
+          <a:bodyPr wrap="square" bIns="72000" rtlCol="0">
+            <a:spAutoFit/>
+          </a:bodyPr>
+          <a:lstStyle/>
+          <a:p>
+            <a:pPr algn="ctr"/>
+            <a:r>
+              <a:rPr lang="en-GB" dirty="0" smtClean="0"/>
+              <a:t>Farm economics</a:t>
+            </a:r>
+            <a:endParaRPr lang="en-GB" dirty="0"/>
+          </a:p>
+        </p:txBody>
+      </p:sp>
+      <p:sp>
+        <p:nvSpPr>
+          <p:cNvPr id="43" name="TextBox 42"/>
+          <p:cNvSpPr txBox="1"/>
+          <p:nvPr/>
+        </p:nvSpPr>
+        <p:spPr>
+          <a:xfrm>
+            <a:off x="2082501" y="1392290"/>
+            <a:ext cx="1076520" cy="457424"/>
+          </a:xfrm>
+          <a:prstGeom prst="rect">
+            <a:avLst/>
+          </a:prstGeom>
+          <a:noFill/>
+          <a:ln w="25400">
+            <a:solidFill>
+              <a:schemeClr val="tx1"/>
+            </a:solidFill>
+          </a:ln>
+        </p:spPr>
+        <p:txBody>
+          <a:bodyPr wrap="square" bIns="72000" rtlCol="0">
+            <a:spAutoFit/>
+          </a:bodyPr>
+          <a:lstStyle/>
+          <a:p>
+            <a:pPr algn="ctr"/>
+            <a:r>
+              <a:rPr lang="en-GB" dirty="0" smtClean="0"/>
+              <a:t>Herbicide resistance</a:t>
+            </a:r>
+            <a:endParaRPr lang="en-GB" dirty="0"/>
+          </a:p>
+        </p:txBody>
+      </p:sp>
+      <p:sp>
+        <p:nvSpPr>
+          <p:cNvPr id="44" name="TextBox 43"/>
+          <p:cNvSpPr txBox="1"/>
+          <p:nvPr/>
+        </p:nvSpPr>
+        <p:spPr>
+          <a:xfrm>
+            <a:off x="3252631" y="1111459"/>
+            <a:ext cx="1170130" cy="734423"/>
+          </a:xfrm>
+          <a:prstGeom prst="rect">
+            <a:avLst/>
+          </a:prstGeom>
+          <a:noFill/>
+          <a:ln w="25400">
+            <a:solidFill>
+              <a:schemeClr val="tx1"/>
+            </a:solidFill>
+          </a:ln>
+        </p:spPr>
+        <p:txBody>
+          <a:bodyPr wrap="square" lIns="288000" bIns="72000" rtlCol="0">
+            <a:spAutoFit/>
+          </a:bodyPr>
+          <a:lstStyle/>
+          <a:p>
+            <a:pPr marL="23400"/>
+            <a:r>
+              <a:rPr lang="en-GB" dirty="0" smtClean="0"/>
+              <a:t>Environment</a:t>
+            </a:r>
+          </a:p>
+          <a:p>
+            <a:pPr>
+              <a:buFontTx/>
+              <a:buChar char="-"/>
+            </a:pPr>
+            <a:r>
+              <a:rPr lang="en-GB" dirty="0" smtClean="0"/>
+              <a:t> </a:t>
+            </a:r>
+            <a:r>
+              <a:rPr lang="en-GB" sz="900" dirty="0"/>
+              <a:t>Biodiversity</a:t>
+            </a:r>
+          </a:p>
+          <a:p>
+            <a:pPr>
+              <a:buFontTx/>
+              <a:buChar char="-"/>
+            </a:pPr>
+            <a:r>
+              <a:rPr lang="en-GB" sz="900" dirty="0"/>
+              <a:t> GHGs</a:t>
+            </a:r>
+          </a:p>
+          <a:p>
+            <a:pPr>
+              <a:buFontTx/>
+              <a:buChar char="-"/>
+            </a:pPr>
+            <a:r>
+              <a:rPr lang="en-GB" sz="900" dirty="0"/>
+              <a:t> Water quality</a:t>
+            </a:r>
+          </a:p>
+        </p:txBody>
+      </p:sp>
+      <p:sp>
+        <p:nvSpPr>
+          <p:cNvPr id="45" name="Rectangle 44"/>
+          <p:cNvSpPr/>
+          <p:nvPr/>
+        </p:nvSpPr>
+        <p:spPr>
+          <a:xfrm>
+            <a:off x="818761" y="1017849"/>
+            <a:ext cx="3697611" cy="889299"/>
+          </a:xfrm>
+          <a:prstGeom prst="rect">
+            <a:avLst/>
+          </a:prstGeom>
+          <a:noFill/>
+          <a:ln>
+            <a:solidFill>
+              <a:schemeClr val="tx1"/>
+            </a:solidFill>
+          </a:ln>
+        </p:spPr>
+        <p:style>
+          <a:lnRef idx="2">
+            <a:schemeClr val="accent1">
+              <a:shade val="50000"/>
+            </a:schemeClr>
+          </a:lnRef>
+          <a:fillRef idx="1">
+            <a:schemeClr val="accent1"/>
+          </a:fillRef>
+          <a:effectRef idx="0">
+            <a:schemeClr val="accent1"/>
+          </a:effectRef>
+          <a:fontRef idx="minor">
+            <a:schemeClr val="lt1"/>
+          </a:fontRef>
+        </p:style>
+        <p:txBody>
+          <a:bodyPr bIns="72000" rtlCol="0" anchor="ctr"/>
+          <a:lstStyle/>
+          <a:p>
+            <a:pPr algn="ctr"/>
+            <a:endParaRPr lang="en-GB"/>
+          </a:p>
+        </p:txBody>
+      </p:sp>
+      <p:sp>
+        <p:nvSpPr>
+          <p:cNvPr id="46" name="TextBox 45"/>
+          <p:cNvSpPr txBox="1"/>
+          <p:nvPr/>
+        </p:nvSpPr>
+        <p:spPr>
+          <a:xfrm>
+            <a:off x="912371" y="1064654"/>
+            <a:ext cx="2153039" cy="288147"/>
+          </a:xfrm>
+          <a:prstGeom prst="rect">
+            <a:avLst/>
+          </a:prstGeom>
+          <a:noFill/>
+        </p:spPr>
+        <p:txBody>
+          <a:bodyPr wrap="square" bIns="72000" rtlCol="0">
+            <a:spAutoFit/>
+          </a:bodyPr>
+          <a:lstStyle/>
+          <a:p>
+            <a:r>
+              <a:rPr lang="en-GB" b="1" dirty="0" smtClean="0"/>
+              <a:t>Impact Analyses</a:t>
+            </a:r>
+            <a:endParaRPr lang="en-GB" b="1" dirty="0"/>
+          </a:p>
+        </p:txBody>
+      </p:sp>
+      <p:cxnSp>
+        <p:nvCxnSpPr>
+          <p:cNvPr id="47" name="Straight Arrow Connector 46"/>
+          <p:cNvCxnSpPr>
+            <a:stCxn id="39" idx="2"/>
+            <a:endCxn id="45" idx="0"/>
+          </p:cNvCxnSpPr>
+          <p:nvPr/>
+        </p:nvCxnSpPr>
+        <p:spPr>
+          <a:xfrm>
+            <a:off x="2667566" y="773194"/>
+            <a:ext cx="1" cy="244655"/>
+          </a:xfrm>
+          <a:prstGeom prst="straightConnector1">
+            <a:avLst/>
+          </a:prstGeom>
+          <a:ln w="25400">
+            <a:solidFill>
+              <a:schemeClr val="tx1"/>
+            </a:solidFill>
+            <a:tailEnd type="arrow"/>
+          </a:ln>
+        </p:spPr>
+        <p:style>
+          <a:lnRef idx="1">
+            <a:schemeClr val="accent1"/>
+          </a:lnRef>
+          <a:fillRef idx="0">
+            <a:schemeClr val="accent1"/>
+          </a:fillRef>
+          <a:effectRef idx="0">
+            <a:schemeClr val="accent1"/>
+          </a:effectRef>
+          <a:fontRef idx="minor">
+            <a:schemeClr val="tx1"/>
+          </a:fontRef>
+        </p:style>
+      </p:cxnSp>
+      <p:sp>
+        <p:nvSpPr>
+          <p:cNvPr id="48" name="TextBox 47"/>
+          <p:cNvSpPr txBox="1"/>
+          <p:nvPr/>
+        </p:nvSpPr>
+        <p:spPr>
+          <a:xfrm>
+            <a:off x="1848475" y="2187978"/>
+            <a:ext cx="1638182" cy="457424"/>
+          </a:xfrm>
+          <a:prstGeom prst="rect">
+            <a:avLst/>
+          </a:prstGeom>
+          <a:noFill/>
+          <a:ln w="25400">
+            <a:solidFill>
+              <a:schemeClr val="tx1"/>
+            </a:solidFill>
+          </a:ln>
+        </p:spPr>
+        <p:txBody>
+          <a:bodyPr wrap="square" bIns="72000" rtlCol="0">
+            <a:spAutoFit/>
+          </a:bodyPr>
+          <a:lstStyle/>
+          <a:p>
+            <a:pPr algn="ctr"/>
+            <a:r>
+              <a:rPr lang="en-GB" b="1" dirty="0" smtClean="0"/>
+              <a:t>Risk identification and response options</a:t>
+            </a:r>
+            <a:endParaRPr lang="en-GB" b="1" dirty="0"/>
+          </a:p>
+        </p:txBody>
+      </p:sp>
+      <p:cxnSp>
+        <p:nvCxnSpPr>
+          <p:cNvPr id="49" name="Straight Arrow Connector 48"/>
+          <p:cNvCxnSpPr>
+            <a:stCxn id="45" idx="2"/>
+            <a:endCxn id="48" idx="0"/>
+          </p:cNvCxnSpPr>
+          <p:nvPr/>
+        </p:nvCxnSpPr>
+        <p:spPr>
+          <a:xfrm flipH="1">
+            <a:off x="2667566" y="1907148"/>
+            <a:ext cx="1" cy="280830"/>
+          </a:xfrm>
+          <a:prstGeom prst="straightConnector1">
+            <a:avLst/>
+          </a:prstGeom>
+          <a:ln w="25400">
+            <a:solidFill>
+              <a:schemeClr val="tx1"/>
+            </a:solidFill>
+            <a:tailEnd type="arrow"/>
+          </a:ln>
+        </p:spPr>
+        <p:style>
+          <a:lnRef idx="1">
+            <a:schemeClr val="accent1"/>
+          </a:lnRef>
+          <a:fillRef idx="0">
+            <a:schemeClr val="accent1"/>
+          </a:fillRef>
+          <a:effectRef idx="0">
+            <a:schemeClr val="accent1"/>
+          </a:effectRef>
+          <a:fontRef idx="minor">
+            <a:schemeClr val="tx1"/>
+          </a:fontRef>
+        </p:style>
+      </p:cxnSp>
+      <p:cxnSp>
+        <p:nvCxnSpPr>
+          <p:cNvPr id="50" name="Elbow Connector 49"/>
+          <p:cNvCxnSpPr>
+            <a:stCxn id="48" idx="1"/>
+            <a:endCxn id="39" idx="1"/>
+          </p:cNvCxnSpPr>
+          <p:nvPr/>
+        </p:nvCxnSpPr>
+        <p:spPr>
+          <a:xfrm rot="10800000">
+            <a:off x="1848475" y="544482"/>
+            <a:ext cx="12700" cy="1872208"/>
+          </a:xfrm>
+          <a:prstGeom prst="bentConnector3">
+            <a:avLst>
+              <a:gd name="adj1" fmla="val 11300276"/>
+            </a:avLst>
+          </a:prstGeom>
+          <a:ln w="25400">
+            <a:solidFill>
+              <a:schemeClr val="tx1"/>
+            </a:solidFill>
+            <a:tailEnd type="arrow"/>
+          </a:ln>
+        </p:spPr>
+        <p:style>
+          <a:lnRef idx="1">
+            <a:schemeClr val="accent1"/>
+          </a:lnRef>
+          <a:fillRef idx="0">
+            <a:schemeClr val="accent1"/>
+          </a:fillRef>
+          <a:effectRef idx="0">
+            <a:schemeClr val="accent1"/>
+          </a:effectRef>
+          <a:fontRef idx="minor">
+            <a:schemeClr val="tx1"/>
+          </a:fontRef>
+        </p:style>
+      </p:cxnSp>
+      <p:sp>
+        <p:nvSpPr>
+          <p:cNvPr id="17" name="Rectangle 16"/>
+          <p:cNvSpPr/>
+          <p:nvPr/>
+        </p:nvSpPr>
+        <p:spPr>
+          <a:xfrm>
+            <a:off x="0" y="0"/>
+            <a:ext cx="5943600" cy="2971800"/>
+          </a:xfrm>
+          <a:prstGeom prst="rect">
+            <a:avLst/>
+          </a:prstGeom>
+          <a:solidFill>
+            <a:schemeClr val="tx1">
+              <a:alpha val="30000"/>
+            </a:schemeClr>
+          </a:solidFill>
+        </p:spPr>
+        <p:style>
+          <a:lnRef idx="1">
+            <a:schemeClr val="accent1"/>
+          </a:lnRef>
+          <a:fillRef idx="3">
+            <a:schemeClr val="accent1"/>
+          </a:fillRef>
+          <a:effectRef idx="2">
+            <a:schemeClr val="accent1"/>
+          </a:effectRef>
+          <a:fontRef idx="minor">
+            <a:schemeClr val="lt1"/>
+          </a:fontRef>
+        </p:style>
+        <p:txBody>
+          <a:bodyPr rtlCol="0" anchor="ctr"/>
+          <a:lstStyle/>
+          <a:p>
+            <a:pPr algn="ctr"/>
+            <a:endParaRPr lang="en-US"/>
+          </a:p>
+        </p:txBody>
+      </p:sp>
+    </p:spTree>
+    <p:extLst>
+      <p:ext uri="{BB962C8B-B14F-4D97-AF65-F5344CB8AC3E}">
+        <p14:creationId xmlns:p14="http://schemas.microsoft.com/office/powerpoint/2010/main" val="840495580"/>
       </p:ext>
     </p:extLst>
   </p:cSld>

</xml_diff>